<commit_message>
2017年 4月 11日 火曜日 18:35:58 JST
</commit_message>
<xml_diff>
--- a/overview.pptx
+++ b/overview.pptx
@@ -5,7 +5,7 @@
     <p:sldMasterId id="2147483648" r:id="rId1"/>
   </p:sldMasterIdLst>
   <p:notesMasterIdLst>
-    <p:notesMasterId r:id="rId15"/>
+    <p:notesMasterId r:id="rId16"/>
   </p:notesMasterIdLst>
   <p:sldIdLst>
     <p:sldId id="256" r:id="rId2"/>
@@ -14,13 +14,14 @@
     <p:sldId id="261" r:id="rId5"/>
     <p:sldId id="260" r:id="rId6"/>
     <p:sldId id="269" r:id="rId7"/>
-    <p:sldId id="266" r:id="rId8"/>
-    <p:sldId id="268" r:id="rId9"/>
-    <p:sldId id="272" r:id="rId10"/>
-    <p:sldId id="270" r:id="rId11"/>
-    <p:sldId id="271" r:id="rId12"/>
-    <p:sldId id="264" r:id="rId13"/>
-    <p:sldId id="259" r:id="rId14"/>
+    <p:sldId id="273" r:id="rId8"/>
+    <p:sldId id="266" r:id="rId9"/>
+    <p:sldId id="268" r:id="rId10"/>
+    <p:sldId id="272" r:id="rId11"/>
+    <p:sldId id="270" r:id="rId12"/>
+    <p:sldId id="271" r:id="rId13"/>
+    <p:sldId id="264" r:id="rId14"/>
+    <p:sldId id="259" r:id="rId15"/>
   </p:sldIdLst>
   <p:sldSz cx="12192000" cy="6858000"/>
   <p:notesSz cx="6858000" cy="9144000"/>
@@ -4318,11 +4319,7 @@
           <a:bodyPr/>
           <a:lstStyle/>
           <a:p>
-            <a:r>
-              <a:rPr lang="ja-JP" altLang="en-US" dirty="0"/>
-              <a:t>内容の似た仲良しの研究会があるかどうか</a:t>
-            </a:r>
-            <a:endParaRPr kumimoji="1" lang="ja-JP" altLang="en-US" dirty="0"/>
+            <a:endParaRPr kumimoji="1" lang="ja-JP" altLang="en-US"/>
           </a:p>
         </p:txBody>
       </p:sp>
@@ -4343,7 +4340,7 @@
           <a:p>
             <a:r>
               <a:rPr kumimoji="1" lang="ja-JP" altLang="en-US" dirty="0" smtClean="0"/>
-              <a:t>研究会ごとの特性</a:t>
+              <a:t>査読サポート</a:t>
             </a:r>
             <a:endParaRPr kumimoji="1" lang="ja-JP" altLang="en-US" dirty="0"/>
           </a:p>
@@ -4352,7 +4349,7 @@
     </p:spTree>
     <p:extLst>
       <p:ext uri="{BB962C8B-B14F-4D97-AF65-F5344CB8AC3E}">
-        <p14:creationId xmlns:p14="http://schemas.microsoft.com/office/powerpoint/2010/main" val="1432098372"/>
+        <p14:creationId xmlns:p14="http://schemas.microsoft.com/office/powerpoint/2010/main" val="1476161769"/>
       </p:ext>
     </p:extLst>
   </p:cSld>
@@ -4418,7 +4415,11 @@
           <a:bodyPr/>
           <a:lstStyle/>
           <a:p>
-            <a:endParaRPr kumimoji="1" lang="ja-JP" altLang="en-US"/>
+            <a:r>
+              <a:rPr lang="ja-JP" altLang="en-US" dirty="0"/>
+              <a:t>内容の似た仲良しの研究会があるかどうか</a:t>
+            </a:r>
+            <a:endParaRPr kumimoji="1" lang="ja-JP" altLang="en-US" dirty="0"/>
           </a:p>
         </p:txBody>
       </p:sp>
@@ -4439,7 +4440,7 @@
           <a:p>
             <a:r>
               <a:rPr kumimoji="1" lang="ja-JP" altLang="en-US" dirty="0" smtClean="0"/>
-              <a:t>著者ごとの派閥</a:t>
+              <a:t>研究会ごとの特性</a:t>
             </a:r>
             <a:endParaRPr kumimoji="1" lang="ja-JP" altLang="en-US" dirty="0"/>
           </a:p>
@@ -4448,7 +4449,7 @@
     </p:spTree>
     <p:extLst>
       <p:ext uri="{BB962C8B-B14F-4D97-AF65-F5344CB8AC3E}">
-        <p14:creationId xmlns:p14="http://schemas.microsoft.com/office/powerpoint/2010/main" val="2129745687"/>
+        <p14:creationId xmlns:p14="http://schemas.microsoft.com/office/powerpoint/2010/main" val="1432098372"/>
       </p:ext>
     </p:extLst>
   </p:cSld>
@@ -4514,38 +4515,7 @@
           <a:bodyPr/>
           <a:lstStyle/>
           <a:p>
-            <a:r>
-              <a:rPr kumimoji="1" lang="en-US" altLang="ja-JP" dirty="0" smtClean="0"/>
-              <a:t>node</a:t>
-            </a:r>
-            <a:r>
-              <a:rPr kumimoji="1" lang="ja-JP" altLang="en-US" dirty="0" smtClean="0"/>
-              <a:t>背景に画像</a:t>
-            </a:r>
-            <a:endParaRPr kumimoji="1" lang="en-US" altLang="ja-JP" dirty="0" smtClean="0"/>
-          </a:p>
-          <a:p>
-            <a:pPr lvl="1"/>
-            <a:r>
-              <a:rPr lang="en-US" altLang="ja-JP" dirty="0" smtClean="0"/>
-              <a:t>belonging</a:t>
-            </a:r>
-            <a:endParaRPr kumimoji="1" lang="en-US" altLang="ja-JP" dirty="0" smtClean="0"/>
-          </a:p>
-          <a:p>
-            <a:pPr lvl="1"/>
-            <a:r>
-              <a:rPr lang="en-US" altLang="ja-JP" dirty="0" smtClean="0"/>
-              <a:t>conference</a:t>
-            </a:r>
-          </a:p>
-          <a:p>
-            <a:pPr lvl="1"/>
-            <a:r>
-              <a:rPr kumimoji="1" lang="en-US" altLang="ja-JP" dirty="0" smtClean="0"/>
-              <a:t>author</a:t>
-            </a:r>
-            <a:endParaRPr kumimoji="1" lang="ja-JP" altLang="en-US" dirty="0"/>
+            <a:endParaRPr kumimoji="1" lang="ja-JP" altLang="en-US"/>
           </a:p>
         </p:txBody>
       </p:sp>
@@ -4564,14 +4534,18 @@
           <a:bodyPr/>
           <a:lstStyle/>
           <a:p>
-            <a:endParaRPr kumimoji="1" lang="ja-JP" altLang="en-US"/>
+            <a:r>
+              <a:rPr kumimoji="1" lang="ja-JP" altLang="en-US" dirty="0" smtClean="0"/>
+              <a:t>著者ごとの派閥</a:t>
+            </a:r>
+            <a:endParaRPr kumimoji="1" lang="ja-JP" altLang="en-US" dirty="0"/>
           </a:p>
         </p:txBody>
       </p:sp>
     </p:spTree>
     <p:extLst>
       <p:ext uri="{BB962C8B-B14F-4D97-AF65-F5344CB8AC3E}">
-        <p14:creationId xmlns:p14="http://schemas.microsoft.com/office/powerpoint/2010/main" val="1975414422"/>
+        <p14:creationId xmlns:p14="http://schemas.microsoft.com/office/powerpoint/2010/main" val="2129745687"/>
       </p:ext>
     </p:extLst>
   </p:cSld>
@@ -4617,6 +4591,129 @@
               <a:rPr kumimoji="1" lang="ja-JP" altLang="en-US" smtClean="0"/>
               <a:pPr/>
               <a:t>13</a:t>
+            </a:fld>
+            <a:endParaRPr kumimoji="1" lang="ja-JP" altLang="en-US"/>
+          </a:p>
+        </p:txBody>
+      </p:sp>
+      <p:sp>
+        <p:nvSpPr>
+          <p:cNvPr id="3" name="コンテンツ プレースホルダー 2"/>
+          <p:cNvSpPr>
+            <a:spLocks noGrp="1"/>
+          </p:cNvSpPr>
+          <p:nvPr>
+            <p:ph idx="1"/>
+          </p:nvPr>
+        </p:nvSpPr>
+        <p:spPr/>
+        <p:txBody>
+          <a:bodyPr/>
+          <a:lstStyle/>
+          <a:p>
+            <a:r>
+              <a:rPr kumimoji="1" lang="en-US" altLang="ja-JP" dirty="0" smtClean="0"/>
+              <a:t>node</a:t>
+            </a:r>
+            <a:r>
+              <a:rPr kumimoji="1" lang="ja-JP" altLang="en-US" dirty="0" smtClean="0"/>
+              <a:t>背景に画像</a:t>
+            </a:r>
+            <a:endParaRPr kumimoji="1" lang="en-US" altLang="ja-JP" dirty="0" smtClean="0"/>
+          </a:p>
+          <a:p>
+            <a:pPr lvl="1"/>
+            <a:r>
+              <a:rPr lang="en-US" altLang="ja-JP" dirty="0" smtClean="0"/>
+              <a:t>belonging</a:t>
+            </a:r>
+            <a:endParaRPr kumimoji="1" lang="en-US" altLang="ja-JP" dirty="0" smtClean="0"/>
+          </a:p>
+          <a:p>
+            <a:pPr lvl="1"/>
+            <a:r>
+              <a:rPr lang="en-US" altLang="ja-JP" dirty="0" smtClean="0"/>
+              <a:t>conference</a:t>
+            </a:r>
+          </a:p>
+          <a:p>
+            <a:pPr lvl="1"/>
+            <a:r>
+              <a:rPr kumimoji="1" lang="en-US" altLang="ja-JP" dirty="0" smtClean="0"/>
+              <a:t>author</a:t>
+            </a:r>
+            <a:endParaRPr kumimoji="1" lang="ja-JP" altLang="en-US" dirty="0"/>
+          </a:p>
+        </p:txBody>
+      </p:sp>
+      <p:sp>
+        <p:nvSpPr>
+          <p:cNvPr id="4" name="タイトル 3"/>
+          <p:cNvSpPr>
+            <a:spLocks noGrp="1"/>
+          </p:cNvSpPr>
+          <p:nvPr>
+            <p:ph type="title"/>
+          </p:nvPr>
+        </p:nvSpPr>
+        <p:spPr/>
+        <p:txBody>
+          <a:bodyPr/>
+          <a:lstStyle/>
+          <a:p>
+            <a:endParaRPr kumimoji="1" lang="ja-JP" altLang="en-US"/>
+          </a:p>
+        </p:txBody>
+      </p:sp>
+    </p:spTree>
+    <p:extLst>
+      <p:ext uri="{BB962C8B-B14F-4D97-AF65-F5344CB8AC3E}">
+        <p14:creationId xmlns:p14="http://schemas.microsoft.com/office/powerpoint/2010/main" val="1975414422"/>
+      </p:ext>
+    </p:extLst>
+  </p:cSld>
+  <p:clrMapOvr>
+    <a:masterClrMapping/>
+  </p:clrMapOvr>
+</p:sld>
+</file>
+
+<file path=ppt/slides/slide14.xml><?xml version="1.0" encoding="utf-8"?>
+<p:sld xmlns:a="http://schemas.openxmlformats.org/drawingml/2006/main" xmlns:r="http://schemas.openxmlformats.org/officeDocument/2006/relationships" xmlns:p="http://schemas.openxmlformats.org/presentationml/2006/main">
+  <p:cSld>
+    <p:spTree>
+      <p:nvGrpSpPr>
+        <p:cNvPr id="1" name=""/>
+        <p:cNvGrpSpPr/>
+        <p:nvPr/>
+      </p:nvGrpSpPr>
+      <p:grpSpPr>
+        <a:xfrm>
+          <a:off x="0" y="0"/>
+          <a:ext cx="0" cy="0"/>
+          <a:chOff x="0" y="0"/>
+          <a:chExt cx="0" cy="0"/>
+        </a:xfrm>
+      </p:grpSpPr>
+      <p:sp>
+        <p:nvSpPr>
+          <p:cNvPr id="2" name="スライド番号プレースホルダー 1"/>
+          <p:cNvSpPr>
+            <a:spLocks noGrp="1"/>
+          </p:cNvSpPr>
+          <p:nvPr>
+            <p:ph type="sldNum" sz="quarter" idx="4"/>
+          </p:nvPr>
+        </p:nvSpPr>
+        <p:spPr/>
+        <p:txBody>
+          <a:bodyPr/>
+          <a:lstStyle/>
+          <a:p>
+            <a:fld id="{80B61DEA-751C-4EFC-848A-C896179D47AE}" type="slidenum">
+              <a:rPr kumimoji="1" lang="ja-JP" altLang="en-US" smtClean="0"/>
+              <a:pPr/>
+              <a:t>14</a:t>
             </a:fld>
             <a:endParaRPr kumimoji="1" lang="ja-JP" altLang="en-US"/>
           </a:p>
@@ -8819,7 +8916,7 @@
           <a:graphicData uri="http://schemas.openxmlformats.org/presentationml/2006/ole">
             <mc:AlternateContent xmlns:mc="http://schemas.openxmlformats.org/markup-compatibility/2006">
               <mc:Choice xmlns:v="urn:schemas-microsoft-com:vml" Requires="v">
-                <p:oleObj spid="_x0000_s1122" name="数式" r:id="rId3" imgW="152280" imgH="215640" progId="Equation.3">
+                <p:oleObj spid="_x0000_s1142" name="数式" r:id="rId3" imgW="152280" imgH="215640" progId="Equation.3">
                   <p:embed/>
                 </p:oleObj>
               </mc:Choice>
@@ -8876,7 +8973,7 @@
           <a:graphicData uri="http://schemas.openxmlformats.org/presentationml/2006/ole">
             <mc:AlternateContent xmlns:mc="http://schemas.openxmlformats.org/markup-compatibility/2006">
               <mc:Choice xmlns:v="urn:schemas-microsoft-com:vml" Requires="v">
-                <p:oleObj spid="_x0000_s1123" name="数式" r:id="rId5" imgW="152280" imgH="215640" progId="Equation.3">
+                <p:oleObj spid="_x0000_s1143" name="数式" r:id="rId5" imgW="152280" imgH="215640" progId="Equation.3">
                   <p:embed/>
                 </p:oleObj>
               </mc:Choice>
@@ -8959,7 +9056,7 @@
           <a:graphicData uri="http://schemas.openxmlformats.org/presentationml/2006/ole">
             <mc:AlternateContent xmlns:mc="http://schemas.openxmlformats.org/markup-compatibility/2006">
               <mc:Choice xmlns:v="urn:schemas-microsoft-com:vml" Requires="v">
-                <p:oleObj spid="_x0000_s1124" name="数式" r:id="rId7" imgW="736560" imgH="215640" progId="Equation.3">
+                <p:oleObj spid="_x0000_s1144" name="数式" r:id="rId7" imgW="736560" imgH="215640" progId="Equation.3">
                   <p:embed/>
                 </p:oleObj>
               </mc:Choice>
@@ -9085,7 +9182,7 @@
           <a:graphicData uri="http://schemas.openxmlformats.org/presentationml/2006/ole">
             <mc:AlternateContent xmlns:mc="http://schemas.openxmlformats.org/markup-compatibility/2006">
               <mc:Choice xmlns:v="urn:schemas-microsoft-com:vml" Requires="v">
-                <p:oleObj spid="_x0000_s1125" name="数式" r:id="rId9" imgW="1206360" imgH="330120" progId="Equation.3">
+                <p:oleObj spid="_x0000_s1145" name="数式" r:id="rId9" imgW="1206360" imgH="330120" progId="Equation.3">
                   <p:embed/>
                 </p:oleObj>
               </mc:Choice>
@@ -9155,7 +9252,7 @@
         <p:spPr>
           <a:xfrm>
             <a:off x="0" y="5644495"/>
-            <a:ext cx="5562600" cy="369332"/>
+            <a:ext cx="5562600" cy="923330"/>
           </a:xfrm>
           <a:prstGeom prst="rect">
             <a:avLst/>
@@ -9176,6 +9273,42 @@
             <a:r>
               <a:rPr lang="ja-JP" altLang="en-US" dirty="0" smtClean="0"/>
               <a:t>まではメトリック計算を職人技でやってた？</a:t>
+            </a:r>
+            <a:endParaRPr lang="en-US" altLang="ja-JP" dirty="0" smtClean="0"/>
+          </a:p>
+          <a:p>
+            <a:pPr algn="ctr"/>
+            <a:r>
+              <a:rPr lang="ja-JP" altLang="en-US" dirty="0" smtClean="0"/>
+              <a:t>パラメータ：</a:t>
+            </a:r>
+            <a:r>
+              <a:rPr lang="en-US" altLang="ja-JP" dirty="0" smtClean="0"/>
+              <a:t>authors</a:t>
+            </a:r>
+            <a:r>
+              <a:rPr lang="en-US" altLang="ja-JP" dirty="0"/>
+              <a:t>, keywords, </a:t>
+            </a:r>
+            <a:r>
+              <a:rPr lang="en-US" altLang="ja-JP" dirty="0" err="1" smtClean="0"/>
+              <a:t>citings</a:t>
+            </a:r>
+            <a:r>
+              <a:rPr lang="en-US" altLang="ja-JP" dirty="0"/>
+              <a:t>, </a:t>
+            </a:r>
+            <a:r>
+              <a:rPr lang="en-US" altLang="ja-JP" dirty="0" err="1" smtClean="0"/>
+              <a:t>citeds</a:t>
+            </a:r>
+            <a:r>
+              <a:rPr lang="en-US" altLang="ja-JP" dirty="0"/>
+              <a:t>, </a:t>
+            </a:r>
+            <a:r>
+              <a:rPr lang="en-US" altLang="ja-JP" dirty="0" err="1"/>
+              <a:t>conference|published</a:t>
             </a:r>
             <a:endParaRPr kumimoji="1" lang="ja-JP" altLang="en-US" dirty="0"/>
           </a:p>
@@ -9508,26 +9641,7 @@
           <a:bodyPr/>
           <a:lstStyle/>
           <a:p>
-            <a:r>
-              <a:rPr lang="ja-JP" altLang="en-US" dirty="0"/>
-              <a:t>日本語</a:t>
-            </a:r>
-            <a:r>
-              <a:rPr lang="ja-JP" altLang="en-US" dirty="0" smtClean="0"/>
-              <a:t>論文対応</a:t>
-            </a:r>
-            <a:endParaRPr lang="en-US" altLang="ja-JP" dirty="0" smtClean="0"/>
-          </a:p>
-          <a:p>
-            <a:r>
-              <a:rPr kumimoji="1" lang="en-US" altLang="ja-JP" dirty="0" smtClean="0"/>
-              <a:t>IEEE</a:t>
-            </a:r>
-            <a:r>
-              <a:rPr lang="ja-JP" altLang="en-US" dirty="0"/>
-              <a:t>以外</a:t>
-            </a:r>
-            <a:endParaRPr kumimoji="1" lang="en-US" altLang="ja-JP" dirty="0" smtClean="0"/>
+            <a:endParaRPr kumimoji="1" lang="ja-JP" altLang="en-US" dirty="0"/>
           </a:p>
         </p:txBody>
       </p:sp>
@@ -9546,14 +9660,18 @@
           <a:bodyPr/>
           <a:lstStyle/>
           <a:p>
-            <a:endParaRPr kumimoji="1" lang="ja-JP" altLang="en-US"/>
+            <a:r>
+              <a:rPr kumimoji="1" lang="ja-JP" altLang="en-US" dirty="0" smtClean="0"/>
+              <a:t>機械学習のチューニング</a:t>
+            </a:r>
+            <a:endParaRPr kumimoji="1" lang="ja-JP" altLang="en-US" dirty="0"/>
           </a:p>
         </p:txBody>
       </p:sp>
     </p:spTree>
     <p:extLst>
       <p:ext uri="{BB962C8B-B14F-4D97-AF65-F5344CB8AC3E}">
-        <p14:creationId xmlns:p14="http://schemas.microsoft.com/office/powerpoint/2010/main" val="1766755709"/>
+        <p14:creationId xmlns:p14="http://schemas.microsoft.com/office/powerpoint/2010/main" val="3117917766"/>
       </p:ext>
     </p:extLst>
   </p:cSld>
@@ -9619,7 +9737,26 @@
           <a:bodyPr/>
           <a:lstStyle/>
           <a:p>
-            <a:endParaRPr kumimoji="1" lang="ja-JP" altLang="en-US" dirty="0"/>
+            <a:r>
+              <a:rPr lang="ja-JP" altLang="en-US" dirty="0"/>
+              <a:t>日本語</a:t>
+            </a:r>
+            <a:r>
+              <a:rPr lang="ja-JP" altLang="en-US" dirty="0" smtClean="0"/>
+              <a:t>論文対応</a:t>
+            </a:r>
+            <a:endParaRPr lang="en-US" altLang="ja-JP" dirty="0" smtClean="0"/>
+          </a:p>
+          <a:p>
+            <a:r>
+              <a:rPr kumimoji="1" lang="en-US" altLang="ja-JP" dirty="0" smtClean="0"/>
+              <a:t>IEEE</a:t>
+            </a:r>
+            <a:r>
+              <a:rPr lang="ja-JP" altLang="en-US" dirty="0"/>
+              <a:t>以外</a:t>
+            </a:r>
+            <a:endParaRPr kumimoji="1" lang="en-US" altLang="ja-JP" dirty="0" smtClean="0"/>
           </a:p>
         </p:txBody>
       </p:sp>
@@ -9635,35 +9772,17 @@
         </p:nvSpPr>
         <p:spPr/>
         <p:txBody>
-          <a:bodyPr>
-            <a:normAutofit/>
-          </a:bodyPr>
+          <a:bodyPr/>
           <a:lstStyle/>
           <a:p>
-            <a:r>
-              <a:rPr lang="ja-JP" altLang="en-US" dirty="0"/>
-              <a:t>論文</a:t>
-            </a:r>
-            <a:r>
-              <a:rPr lang="ja-JP" altLang="en-US" dirty="0" err="1"/>
-              <a:t>探すのめん</a:t>
-            </a:r>
-            <a:r>
-              <a:rPr lang="ja-JP" altLang="en-US" dirty="0"/>
-              <a:t>どく</a:t>
-            </a:r>
-            <a:r>
-              <a:rPr lang="ja-JP" altLang="en-US" dirty="0" smtClean="0"/>
-              <a:t>さい、論文読むのめんどくさい</a:t>
-            </a:r>
-            <a:endParaRPr kumimoji="1" lang="ja-JP" altLang="en-US" dirty="0"/>
+            <a:endParaRPr kumimoji="1" lang="ja-JP" altLang="en-US"/>
           </a:p>
         </p:txBody>
       </p:sp>
     </p:spTree>
     <p:extLst>
       <p:ext uri="{BB962C8B-B14F-4D97-AF65-F5344CB8AC3E}">
-        <p14:creationId xmlns:p14="http://schemas.microsoft.com/office/powerpoint/2010/main" val="3505154345"/>
+        <p14:creationId xmlns:p14="http://schemas.microsoft.com/office/powerpoint/2010/main" val="1766755709"/>
       </p:ext>
     </p:extLst>
   </p:cSld>
@@ -9729,7 +9848,7 @@
           <a:bodyPr/>
           <a:lstStyle/>
           <a:p>
-            <a:endParaRPr kumimoji="1" lang="ja-JP" altLang="en-US"/>
+            <a:endParaRPr kumimoji="1" lang="ja-JP" altLang="en-US" dirty="0"/>
           </a:p>
         </p:txBody>
       </p:sp>
@@ -9745,12 +9864,26 @@
         </p:nvSpPr>
         <p:spPr/>
         <p:txBody>
-          <a:bodyPr/>
+          <a:bodyPr>
+            <a:normAutofit/>
+          </a:bodyPr>
           <a:lstStyle/>
           <a:p>
             <a:r>
-              <a:rPr kumimoji="1" lang="ja-JP" altLang="en-US" dirty="0" smtClean="0"/>
-              <a:t>査読サポート</a:t>
+              <a:rPr lang="ja-JP" altLang="en-US" dirty="0"/>
+              <a:t>論文</a:t>
+            </a:r>
+            <a:r>
+              <a:rPr lang="ja-JP" altLang="en-US" dirty="0" err="1"/>
+              <a:t>探すのめん</a:t>
+            </a:r>
+            <a:r>
+              <a:rPr lang="ja-JP" altLang="en-US" dirty="0"/>
+              <a:t>どく</a:t>
+            </a:r>
+            <a:r>
+              <a:rPr lang="ja-JP" altLang="en-US" dirty="0" smtClean="0"/>
+              <a:t>さい、論文読むのめんどくさい</a:t>
             </a:r>
             <a:endParaRPr kumimoji="1" lang="ja-JP" altLang="en-US" dirty="0"/>
           </a:p>
@@ -9759,7 +9892,7 @@
     </p:spTree>
     <p:extLst>
       <p:ext uri="{BB962C8B-B14F-4D97-AF65-F5344CB8AC3E}">
-        <p14:creationId xmlns:p14="http://schemas.microsoft.com/office/powerpoint/2010/main" val="1476161769"/>
+        <p14:creationId xmlns:p14="http://schemas.microsoft.com/office/powerpoint/2010/main" val="3505154345"/>
       </p:ext>
     </p:extLst>
   </p:cSld>

</xml_diff>

<commit_message>
2017年 4月 25日 火曜日 22:00:18 JST
</commit_message>
<xml_diff>
--- a/overview.pptx
+++ b/overview.pptx
@@ -5,7 +5,7 @@
     <p:sldMasterId id="2147483648" r:id="rId1"/>
   </p:sldMasterIdLst>
   <p:notesMasterIdLst>
-    <p:notesMasterId r:id="rId19"/>
+    <p:notesMasterId r:id="rId20"/>
   </p:notesMasterIdLst>
   <p:sldIdLst>
     <p:sldId id="256" r:id="rId2"/>
@@ -24,7 +24,8 @@
     <p:sldId id="264" r:id="rId15"/>
     <p:sldId id="274" r:id="rId16"/>
     <p:sldId id="276" r:id="rId17"/>
-    <p:sldId id="259" r:id="rId18"/>
+    <p:sldId id="283" r:id="rId18"/>
+    <p:sldId id="259" r:id="rId19"/>
   </p:sldIdLst>
   <p:sldSz cx="12192000" cy="6858000"/>
   <p:notesSz cx="6858000" cy="9144000"/>
@@ -209,7 +210,7 @@
             <a:fld id="{9841980D-5ED3-487F-B3E9-943BB45F7B97}" type="datetimeFigureOut">
               <a:rPr kumimoji="1" lang="ja-JP" altLang="en-US" smtClean="0"/>
               <a:pPr/>
-              <a:t>2017/4/20</a:t>
+              <a:t>2017/4/25</a:t>
             </a:fld>
             <a:endParaRPr kumimoji="1" lang="ja-JP" altLang="en-US"/>
           </a:p>
@@ -401,7 +402,7 @@
             <a:fld id="{D5E6ED6B-3F85-40A1-9484-0C501FDC6FE4}" type="slidenum">
               <a:rPr kumimoji="1" lang="ja-JP" altLang="en-US" smtClean="0"/>
               <a:pPr/>
-              <a:t>‹#›</a:t>
+              <a:t>&lt;#&gt;</a:t>
             </a:fld>
             <a:endParaRPr kumimoji="1" lang="ja-JP" altLang="en-US"/>
           </a:p>
@@ -410,7 +411,7 @@
     </p:spTree>
     <p:extLst>
       <p:ext uri="{BB962C8B-B14F-4D97-AF65-F5344CB8AC3E}">
-        <p14:creationId xmlns:p14="http://schemas.microsoft.com/office/powerpoint/2010/main" val="1647040712"/>
+        <p14:creationId xmlns:p14="http://schemas.microsoft.com/office/powerpoint/2010/main" xmlns="" val="1647040712"/>
       </p:ext>
     </p:extLst>
   </p:cSld>
@@ -617,7 +618,7 @@
     </p:spTree>
     <p:extLst>
       <p:ext uri="{BB962C8B-B14F-4D97-AF65-F5344CB8AC3E}">
-        <p14:creationId xmlns:p14="http://schemas.microsoft.com/office/powerpoint/2010/main" val="1657077930"/>
+        <p14:creationId xmlns:p14="http://schemas.microsoft.com/office/powerpoint/2010/main" xmlns="" val="1657077930"/>
       </p:ext>
     </p:extLst>
   </p:cSld>
@@ -774,7 +775,7 @@
           <a:blip r:embed="rId2" cstate="print">
             <a:extLst>
               <a:ext uri="{28A0092B-C50C-407E-A947-70E740481C1C}">
-                <a14:useLocalDpi xmlns:a14="http://schemas.microsoft.com/office/drawing/2010/main" val="0"/>
+                <a14:useLocalDpi xmlns:a14="http://schemas.microsoft.com/office/drawing/2010/main" xmlns="" val="0"/>
               </a:ext>
             </a:extLst>
           </a:blip>
@@ -860,7 +861,7 @@
     </p:spTree>
     <p:extLst>
       <p:ext uri="{BB962C8B-B14F-4D97-AF65-F5344CB8AC3E}">
-        <p14:creationId xmlns:p14="http://schemas.microsoft.com/office/powerpoint/2010/main" val="3004416884"/>
+        <p14:creationId xmlns:p14="http://schemas.microsoft.com/office/powerpoint/2010/main" xmlns="" val="3004416884"/>
       </p:ext>
     </p:extLst>
   </p:cSld>
@@ -923,7 +924,7 @@
             <a:fld id="{80B61DEA-751C-4EFC-848A-C896179D47AE}" type="slidenum">
               <a:rPr kumimoji="1" lang="ja-JP" altLang="en-US" smtClean="0"/>
               <a:pPr/>
-              <a:t>‹#›</a:t>
+              <a:t>&lt;#&gt;</a:t>
             </a:fld>
             <a:endParaRPr kumimoji="1" lang="ja-JP" altLang="en-US"/>
           </a:p>
@@ -1217,7 +1218,7 @@
           <a:blip r:embed="rId2" cstate="print">
             <a:extLst>
               <a:ext uri="{28A0092B-C50C-407E-A947-70E740481C1C}">
-                <a14:useLocalDpi xmlns:a14="http://schemas.microsoft.com/office/drawing/2010/main" val="0"/>
+                <a14:useLocalDpi xmlns:a14="http://schemas.microsoft.com/office/drawing/2010/main" xmlns="" val="0"/>
               </a:ext>
             </a:extLst>
           </a:blip>
@@ -1238,7 +1239,7 @@
     </p:spTree>
     <p:extLst>
       <p:ext uri="{BB962C8B-B14F-4D97-AF65-F5344CB8AC3E}">
-        <p14:creationId xmlns:p14="http://schemas.microsoft.com/office/powerpoint/2010/main" val="4214205409"/>
+        <p14:creationId xmlns:p14="http://schemas.microsoft.com/office/powerpoint/2010/main" xmlns="" val="4214205409"/>
       </p:ext>
     </p:extLst>
   </p:cSld>
@@ -1358,7 +1359,7 @@
           <a:blip r:embed="rId2" cstate="print">
             <a:extLst>
               <a:ext uri="{28A0092B-C50C-407E-A947-70E740481C1C}">
-                <a14:useLocalDpi xmlns:a14="http://schemas.microsoft.com/office/drawing/2010/main" val="0"/>
+                <a14:useLocalDpi xmlns:a14="http://schemas.microsoft.com/office/drawing/2010/main" xmlns="" val="0"/>
               </a:ext>
             </a:extLst>
           </a:blip>
@@ -1412,7 +1413,7 @@
             <a:fld id="{80B61DEA-751C-4EFC-848A-C896179D47AE}" type="slidenum">
               <a:rPr kumimoji="1" lang="ja-JP" altLang="en-US" smtClean="0"/>
               <a:pPr/>
-              <a:t>‹#›</a:t>
+              <a:t>&lt;#&gt;</a:t>
             </a:fld>
             <a:endParaRPr kumimoji="1" lang="ja-JP" altLang="en-US"/>
           </a:p>
@@ -1458,7 +1459,7 @@
     </p:spTree>
     <p:extLst>
       <p:ext uri="{BB962C8B-B14F-4D97-AF65-F5344CB8AC3E}">
-        <p14:creationId xmlns:p14="http://schemas.microsoft.com/office/powerpoint/2010/main" val="3620504976"/>
+        <p14:creationId xmlns:p14="http://schemas.microsoft.com/office/powerpoint/2010/main" xmlns="" val="3620504976"/>
       </p:ext>
     </p:extLst>
   </p:cSld>
@@ -1521,7 +1522,7 @@
             <a:fld id="{80B61DEA-751C-4EFC-848A-C896179D47AE}" type="slidenum">
               <a:rPr kumimoji="1" lang="ja-JP" altLang="en-US" smtClean="0"/>
               <a:pPr/>
-              <a:t>‹#›</a:t>
+              <a:t>&lt;#&gt;</a:t>
             </a:fld>
             <a:endParaRPr kumimoji="1" lang="ja-JP" altLang="en-US"/>
           </a:p>
@@ -1685,7 +1686,7 @@
     </p:spTree>
     <p:extLst>
       <p:ext uri="{BB962C8B-B14F-4D97-AF65-F5344CB8AC3E}">
-        <p14:creationId xmlns:p14="http://schemas.microsoft.com/office/powerpoint/2010/main" val="646152418"/>
+        <p14:creationId xmlns:p14="http://schemas.microsoft.com/office/powerpoint/2010/main" xmlns="" val="646152418"/>
       </p:ext>
     </p:extLst>
   </p:cSld>
@@ -1748,7 +1749,7 @@
             <a:fld id="{78817559-BB6D-4C96-94D1-43E03D71EB93}" type="datetime1">
               <a:rPr kumimoji="1" lang="ja-JP" altLang="en-US" smtClean="0"/>
               <a:pPr/>
-              <a:t>2017/4/20</a:t>
+              <a:t>2017/4/25</a:t>
             </a:fld>
             <a:endParaRPr kumimoji="1" lang="ja-JP" altLang="en-US" dirty="0"/>
           </a:p>
@@ -1790,7 +1791,7 @@
             <a:fld id="{80B61DEA-751C-4EFC-848A-C896179D47AE}" type="slidenum">
               <a:rPr kumimoji="1" lang="ja-JP" altLang="en-US" smtClean="0"/>
               <a:pPr/>
-              <a:t>‹#›</a:t>
+              <a:t>&lt;#&gt;</a:t>
             </a:fld>
             <a:endParaRPr kumimoji="1" lang="ja-JP" altLang="en-US"/>
           </a:p>
@@ -2099,7 +2100,7 @@
           <a:blip r:embed="rId2" cstate="print">
             <a:extLst>
               <a:ext uri="{28A0092B-C50C-407E-A947-70E740481C1C}">
-                <a14:useLocalDpi xmlns:a14="http://schemas.microsoft.com/office/drawing/2010/main" val="0"/>
+                <a14:useLocalDpi xmlns:a14="http://schemas.microsoft.com/office/drawing/2010/main" xmlns="" val="0"/>
               </a:ext>
             </a:extLst>
           </a:blip>
@@ -2256,7 +2257,7 @@
     </p:spTree>
     <p:extLst>
       <p:ext uri="{BB962C8B-B14F-4D97-AF65-F5344CB8AC3E}">
-        <p14:creationId xmlns:p14="http://schemas.microsoft.com/office/powerpoint/2010/main" val="1584837141"/>
+        <p14:creationId xmlns:p14="http://schemas.microsoft.com/office/powerpoint/2010/main" xmlns="" val="1584837141"/>
       </p:ext>
     </p:extLst>
   </p:cSld>
@@ -2320,7 +2321,7 @@
             <a:fld id="{80B61DEA-751C-4EFC-848A-C896179D47AE}" type="slidenum">
               <a:rPr kumimoji="1" lang="ja-JP" altLang="en-US" smtClean="0"/>
               <a:pPr/>
-              <a:t>‹#›</a:t>
+              <a:t>&lt;#&gt;</a:t>
             </a:fld>
             <a:endParaRPr kumimoji="1" lang="ja-JP" altLang="en-US"/>
           </a:p>
@@ -2629,7 +2630,7 @@
           <a:blip r:embed="rId2" cstate="print">
             <a:extLst>
               <a:ext uri="{28A0092B-C50C-407E-A947-70E740481C1C}">
-                <a14:useLocalDpi xmlns:a14="http://schemas.microsoft.com/office/drawing/2010/main" val="0"/>
+                <a14:useLocalDpi xmlns:a14="http://schemas.microsoft.com/office/drawing/2010/main" xmlns="" val="0"/>
               </a:ext>
             </a:extLst>
           </a:blip>
@@ -3106,7 +3107,7 @@
     </p:spTree>
     <p:extLst>
       <p:ext uri="{BB962C8B-B14F-4D97-AF65-F5344CB8AC3E}">
-        <p14:creationId xmlns:p14="http://schemas.microsoft.com/office/powerpoint/2010/main" val="1163927299"/>
+        <p14:creationId xmlns:p14="http://schemas.microsoft.com/office/powerpoint/2010/main" xmlns="" val="1163927299"/>
       </p:ext>
     </p:extLst>
   </p:cSld>
@@ -3182,7 +3183,7 @@
           <a:blip r:embed="rId2" cstate="print">
             <a:extLst>
               <a:ext uri="{28A0092B-C50C-407E-A947-70E740481C1C}">
-                <a14:useLocalDpi xmlns:a14="http://schemas.microsoft.com/office/drawing/2010/main" val="0"/>
+                <a14:useLocalDpi xmlns:a14="http://schemas.microsoft.com/office/drawing/2010/main" xmlns="" val="0"/>
               </a:ext>
             </a:extLst>
           </a:blip>
@@ -3236,7 +3237,7 @@
             <a:fld id="{80B61DEA-751C-4EFC-848A-C896179D47AE}" type="slidenum">
               <a:rPr kumimoji="1" lang="ja-JP" altLang="en-US" smtClean="0"/>
               <a:pPr/>
-              <a:t>‹#›</a:t>
+              <a:t>&lt;#&gt;</a:t>
             </a:fld>
             <a:endParaRPr kumimoji="1" lang="ja-JP" altLang="en-US"/>
           </a:p>
@@ -3245,7 +3246,7 @@
     </p:spTree>
     <p:extLst>
       <p:ext uri="{BB962C8B-B14F-4D97-AF65-F5344CB8AC3E}">
-        <p14:creationId xmlns:p14="http://schemas.microsoft.com/office/powerpoint/2010/main" val="853120211"/>
+        <p14:creationId xmlns:p14="http://schemas.microsoft.com/office/powerpoint/2010/main" xmlns="" val="853120211"/>
       </p:ext>
     </p:extLst>
   </p:cSld>
@@ -3315,7 +3316,7 @@
             <a:fld id="{80B61DEA-751C-4EFC-848A-C896179D47AE}" type="slidenum">
               <a:rPr kumimoji="1" lang="ja-JP" altLang="en-US" smtClean="0"/>
               <a:pPr/>
-              <a:t>‹#›</a:t>
+              <a:t>&lt;#&gt;</a:t>
             </a:fld>
             <a:endParaRPr kumimoji="1" lang="ja-JP" altLang="en-US"/>
           </a:p>
@@ -3324,7 +3325,7 @@
     </p:spTree>
     <p:extLst>
       <p:ext uri="{BB962C8B-B14F-4D97-AF65-F5344CB8AC3E}">
-        <p14:creationId xmlns:p14="http://schemas.microsoft.com/office/powerpoint/2010/main" val="3099946962"/>
+        <p14:creationId xmlns:p14="http://schemas.microsoft.com/office/powerpoint/2010/main" xmlns="" val="3099946962"/>
       </p:ext>
     </p:extLst>
   </p:cSld>
@@ -3370,7 +3371,7 @@
           <a:blip r:embed="rId2" cstate="print">
             <a:extLst>
               <a:ext uri="{28A0092B-C50C-407E-A947-70E740481C1C}">
-                <a14:useLocalDpi xmlns:a14="http://schemas.microsoft.com/office/drawing/2010/main" val="0"/>
+                <a14:useLocalDpi xmlns:a14="http://schemas.microsoft.com/office/drawing/2010/main" xmlns="" val="0"/>
               </a:ext>
             </a:extLst>
           </a:blip>
@@ -3424,7 +3425,7 @@
             <a:fld id="{80B61DEA-751C-4EFC-848A-C896179D47AE}" type="slidenum">
               <a:rPr kumimoji="1" lang="ja-JP" altLang="en-US" smtClean="0"/>
               <a:pPr/>
-              <a:t>‹#›</a:t>
+              <a:t>&lt;#&gt;</a:t>
             </a:fld>
             <a:endParaRPr kumimoji="1" lang="ja-JP" altLang="en-US"/>
           </a:p>
@@ -3433,7 +3434,7 @@
     </p:spTree>
     <p:extLst>
       <p:ext uri="{BB962C8B-B14F-4D97-AF65-F5344CB8AC3E}">
-        <p14:creationId xmlns:p14="http://schemas.microsoft.com/office/powerpoint/2010/main" val="2408143909"/>
+        <p14:creationId xmlns:p14="http://schemas.microsoft.com/office/powerpoint/2010/main" xmlns="" val="2408143909"/>
       </p:ext>
     </p:extLst>
   </p:cSld>
@@ -3656,7 +3657,7 @@
             <a:fld id="{80B61DEA-751C-4EFC-848A-C896179D47AE}" type="slidenum">
               <a:rPr kumimoji="1" lang="ja-JP" altLang="en-US" smtClean="0"/>
               <a:pPr/>
-              <a:t>‹#›</a:t>
+              <a:t>&lt;#&gt;</a:t>
             </a:fld>
             <a:endParaRPr kumimoji="1" lang="ja-JP" altLang="en-US"/>
           </a:p>
@@ -3778,7 +3779,7 @@
     </p:spTree>
     <p:extLst>
       <p:ext uri="{BB962C8B-B14F-4D97-AF65-F5344CB8AC3E}">
-        <p14:creationId xmlns:p14="http://schemas.microsoft.com/office/powerpoint/2010/main" val="3722099324"/>
+        <p14:creationId xmlns:p14="http://schemas.microsoft.com/office/powerpoint/2010/main" xmlns="" val="3722099324"/>
       </p:ext>
     </p:extLst>
   </p:cSld>
@@ -4285,7 +4286,7 @@
     </p:spTree>
     <p:extLst>
       <p:ext uri="{BB962C8B-B14F-4D97-AF65-F5344CB8AC3E}">
-        <p14:creationId xmlns:p14="http://schemas.microsoft.com/office/powerpoint/2010/main" val="291693654"/>
+        <p14:creationId xmlns:p14="http://schemas.microsoft.com/office/powerpoint/2010/main" xmlns="" val="291693654"/>
       </p:ext>
     </p:extLst>
   </p:cSld>
@@ -4402,7 +4403,7 @@
     </p:spTree>
     <p:extLst>
       <p:ext uri="{BB962C8B-B14F-4D97-AF65-F5344CB8AC3E}">
-        <p14:creationId xmlns:p14="http://schemas.microsoft.com/office/powerpoint/2010/main" val="3505154345"/>
+        <p14:creationId xmlns:p14="http://schemas.microsoft.com/office/powerpoint/2010/main" xmlns="" val="3505154345"/>
       </p:ext>
     </p:extLst>
   </p:cSld>
@@ -4505,7 +4506,7 @@
     </p:spTree>
     <p:extLst>
       <p:ext uri="{BB962C8B-B14F-4D97-AF65-F5344CB8AC3E}">
-        <p14:creationId xmlns:p14="http://schemas.microsoft.com/office/powerpoint/2010/main" val="1476161769"/>
+        <p14:creationId xmlns:p14="http://schemas.microsoft.com/office/powerpoint/2010/main" xmlns="" val="1476161769"/>
       </p:ext>
     </p:extLst>
   </p:cSld>
@@ -4612,7 +4613,7 @@
     </p:spTree>
     <p:extLst>
       <p:ext uri="{BB962C8B-B14F-4D97-AF65-F5344CB8AC3E}">
-        <p14:creationId xmlns:p14="http://schemas.microsoft.com/office/powerpoint/2010/main" val="1432098372"/>
+        <p14:creationId xmlns:p14="http://schemas.microsoft.com/office/powerpoint/2010/main" xmlns="" val="1432098372"/>
       </p:ext>
     </p:extLst>
   </p:cSld>
@@ -4715,7 +4716,7 @@
     </p:spTree>
     <p:extLst>
       <p:ext uri="{BB962C8B-B14F-4D97-AF65-F5344CB8AC3E}">
-        <p14:creationId xmlns:p14="http://schemas.microsoft.com/office/powerpoint/2010/main" val="2129745687"/>
+        <p14:creationId xmlns:p14="http://schemas.microsoft.com/office/powerpoint/2010/main" xmlns="" val="2129745687"/>
       </p:ext>
     </p:extLst>
   </p:cSld>
@@ -4845,7 +4846,7 @@
     </p:spTree>
     <p:extLst>
       <p:ext uri="{BB962C8B-B14F-4D97-AF65-F5344CB8AC3E}">
-        <p14:creationId xmlns:p14="http://schemas.microsoft.com/office/powerpoint/2010/main" val="1975414422"/>
+        <p14:creationId xmlns:p14="http://schemas.microsoft.com/office/powerpoint/2010/main" xmlns="" val="1975414422"/>
       </p:ext>
     </p:extLst>
   </p:cSld>
@@ -5067,7 +5068,7 @@
     </p:spTree>
     <p:extLst>
       <p:ext uri="{BB962C8B-B14F-4D97-AF65-F5344CB8AC3E}">
-        <p14:creationId xmlns:p14="http://schemas.microsoft.com/office/powerpoint/2010/main" val="1809590951"/>
+        <p14:creationId xmlns:p14="http://schemas.microsoft.com/office/powerpoint/2010/main" xmlns="" val="1809590951"/>
       </p:ext>
     </p:extLst>
   </p:cSld>
@@ -5103,6 +5104,128 @@
       </p:grpSpPr>
       <p:sp>
         <p:nvSpPr>
+          <p:cNvPr id="2" name="スライド番号プレースホルダ 1"/>
+          <p:cNvSpPr>
+            <a:spLocks noGrp="1"/>
+          </p:cNvSpPr>
+          <p:nvPr>
+            <p:ph type="sldNum" sz="quarter" idx="4"/>
+          </p:nvPr>
+        </p:nvSpPr>
+        <p:spPr/>
+        <p:txBody>
+          <a:bodyPr/>
+          <a:lstStyle/>
+          <a:p>
+            <a:fld id="{80B61DEA-751C-4EFC-848A-C896179D47AE}" type="slidenum">
+              <a:rPr kumimoji="1" lang="ja-JP" altLang="en-US" smtClean="0"/>
+              <a:pPr/>
+              <a:t>17</a:t>
+            </a:fld>
+            <a:endParaRPr kumimoji="1" lang="ja-JP" altLang="en-US"/>
+          </a:p>
+        </p:txBody>
+      </p:sp>
+      <p:sp>
+        <p:nvSpPr>
+          <p:cNvPr id="4" name="タイトル 3"/>
+          <p:cNvSpPr>
+            <a:spLocks noGrp="1"/>
+          </p:cNvSpPr>
+          <p:nvPr>
+            <p:ph type="title"/>
+          </p:nvPr>
+        </p:nvSpPr>
+        <p:spPr/>
+        <p:txBody>
+          <a:bodyPr/>
+          <a:lstStyle/>
+          <a:p>
+            <a:r>
+              <a:rPr kumimoji="1" lang="en-US" altLang="ja-JP" dirty="0" smtClean="0"/>
+              <a:t>MNIST</a:t>
+            </a:r>
+            <a:r>
+              <a:rPr kumimoji="1" lang="ja-JP" altLang="en-US" dirty="0" smtClean="0"/>
+              <a:t>可視化</a:t>
+            </a:r>
+            <a:endParaRPr kumimoji="1" lang="ja-JP" altLang="en-US" dirty="0"/>
+          </a:p>
+        </p:txBody>
+      </p:sp>
+      <p:sp>
+        <p:nvSpPr>
+          <p:cNvPr id="5" name="テキスト ボックス 4"/>
+          <p:cNvSpPr txBox="1"/>
+          <p:nvPr/>
+        </p:nvSpPr>
+        <p:spPr>
+          <a:xfrm>
+            <a:off x="4185920" y="2651760"/>
+            <a:ext cx="7772400" cy="923330"/>
+          </a:xfrm>
+          <a:prstGeom prst="rect">
+            <a:avLst/>
+          </a:prstGeom>
+          <a:noFill/>
+        </p:spPr>
+        <p:txBody>
+          <a:bodyPr wrap="square" rtlCol="0">
+            <a:spAutoFit/>
+          </a:bodyPr>
+          <a:lstStyle/>
+          <a:p>
+            <a:r>
+              <a:rPr lang="en-US" altLang="ja-JP" dirty="0" smtClean="0"/>
+              <a:t>[-</a:t>
+            </a:r>
+            <a:r>
+              <a:rPr lang="en-US" altLang="ja-JP" dirty="0" smtClean="0"/>
+              <a:t>1.21743047, -1.50154686 , 0.56333548, -1.86107993, -0.76638579 </a:t>
+            </a:r>
+          </a:p>
+          <a:p>
+            <a:r>
+              <a:rPr lang="en-US" altLang="ja-JP" dirty="0" smtClean="0"/>
+              <a:t>-1.07891524, 7.67469597, -2.81896377, -1.02743566 , -</a:t>
+            </a:r>
+            <a:r>
+              <a:rPr lang="en-US" altLang="ja-JP" dirty="0" smtClean="0"/>
+              <a:t>3.27699995]</a:t>
+            </a:r>
+          </a:p>
+          <a:p>
+            <a:endParaRPr kumimoji="1" lang="ja-JP" altLang="en-US" dirty="0"/>
+          </a:p>
+        </p:txBody>
+      </p:sp>
+    </p:spTree>
+  </p:cSld>
+  <p:clrMapOvr>
+    <a:masterClrMapping/>
+  </p:clrMapOvr>
+</p:sld>
+</file>
+
+<file path=ppt/slides/slide18.xml><?xml version="1.0" encoding="utf-8"?>
+<p:sld xmlns:a="http://schemas.openxmlformats.org/drawingml/2006/main" xmlns:r="http://schemas.openxmlformats.org/officeDocument/2006/relationships" xmlns:p="http://schemas.openxmlformats.org/presentationml/2006/main">
+  <p:cSld>
+    <p:spTree>
+      <p:nvGrpSpPr>
+        <p:cNvPr id="1" name=""/>
+        <p:cNvGrpSpPr/>
+        <p:nvPr/>
+      </p:nvGrpSpPr>
+      <p:grpSpPr>
+        <a:xfrm>
+          <a:off x="0" y="0"/>
+          <a:ext cx="0" cy="0"/>
+          <a:chOff x="0" y="0"/>
+          <a:chExt cx="0" cy="0"/>
+        </a:xfrm>
+      </p:grpSpPr>
+      <p:sp>
+        <p:nvSpPr>
           <p:cNvPr id="2" name="スライド番号プレースホルダー 1"/>
           <p:cNvSpPr>
             <a:spLocks noGrp="1"/>
@@ -5119,7 +5242,7 @@
             <a:fld id="{80B61DEA-751C-4EFC-848A-C896179D47AE}" type="slidenum">
               <a:rPr kumimoji="1" lang="ja-JP" altLang="en-US" smtClean="0"/>
               <a:pPr/>
-              <a:t>17</a:t>
+              <a:t>18</a:t>
             </a:fld>
             <a:endParaRPr kumimoji="1" lang="ja-JP" altLang="en-US"/>
           </a:p>
@@ -5128,7 +5251,7 @@
     </p:spTree>
     <p:extLst>
       <p:ext uri="{BB962C8B-B14F-4D97-AF65-F5344CB8AC3E}">
-        <p14:creationId xmlns:p14="http://schemas.microsoft.com/office/powerpoint/2010/main" val="2288468216"/>
+        <p14:creationId xmlns:p14="http://schemas.microsoft.com/office/powerpoint/2010/main" xmlns="" val="2288468216"/>
       </p:ext>
     </p:extLst>
   </p:cSld>
@@ -5305,7 +5428,7 @@
           <a:blip r:embed="rId2" cstate="print">
             <a:extLst>
               <a:ext uri="{28A0092B-C50C-407E-A947-70E740481C1C}">
-                <a14:useLocalDpi xmlns:a14="http://schemas.microsoft.com/office/drawing/2010/main" val="0"/>
+                <a14:useLocalDpi xmlns:a14="http://schemas.microsoft.com/office/drawing/2010/main" xmlns="" val="0"/>
               </a:ext>
             </a:extLst>
           </a:blip>
@@ -5330,7 +5453,7 @@
           </a:ln>
           <a:extLst>
             <a:ext uri="{909E8E84-426E-40DD-AFC4-6F175D3DCCD1}">
-              <a14:hiddenFill xmlns:a14="http://schemas.microsoft.com/office/drawing/2010/main">
+              <a14:hiddenFill xmlns:a14="http://schemas.microsoft.com/office/drawing/2010/main" xmlns="">
                 <a:solidFill>
                   <a:srgbClr val="FFFFFF"/>
                 </a:solidFill>
@@ -5351,7 +5474,7 @@
           <a:blip r:embed="rId3" cstate="print">
             <a:extLst>
               <a:ext uri="{28A0092B-C50C-407E-A947-70E740481C1C}">
-                <a14:useLocalDpi xmlns:a14="http://schemas.microsoft.com/office/drawing/2010/main" val="0"/>
+                <a14:useLocalDpi xmlns:a14="http://schemas.microsoft.com/office/drawing/2010/main" xmlns="" val="0"/>
               </a:ext>
             </a:extLst>
           </a:blip>
@@ -5374,14 +5497,14 @@
           </a:ln>
           <a:extLst>
             <a:ext uri="{909E8E84-426E-40DD-AFC4-6F175D3DCCD1}">
-              <a14:hiddenFill xmlns:a14="http://schemas.microsoft.com/office/drawing/2010/main">
+              <a14:hiddenFill xmlns:a14="http://schemas.microsoft.com/office/drawing/2010/main" xmlns="">
                 <a:solidFill>
                   <a:schemeClr val="accent1"/>
                 </a:solidFill>
               </a14:hiddenFill>
             </a:ext>
             <a:ext uri="{91240B29-F687-4F45-9708-019B960494DF}">
-              <a14:hiddenLine xmlns:a14="http://schemas.microsoft.com/office/drawing/2010/main" w="9525">
+              <a14:hiddenLine xmlns:a14="http://schemas.microsoft.com/office/drawing/2010/main" xmlns="" w="9525">
                 <a:solidFill>
                   <a:schemeClr val="tx1"/>
                 </a:solidFill>
@@ -5402,10 +5525,10 @@
           <p:nvPr/>
         </p:nvPicPr>
         <p:blipFill>
-          <a:blip r:embed="rId4">
+          <a:blip r:embed="rId4" cstate="print">
             <a:extLst>
               <a:ext uri="{28A0092B-C50C-407E-A947-70E740481C1C}">
-                <a14:useLocalDpi xmlns:a14="http://schemas.microsoft.com/office/drawing/2010/main" val="0"/>
+                <a14:useLocalDpi xmlns:a14="http://schemas.microsoft.com/office/drawing/2010/main" xmlns="" val="0"/>
               </a:ext>
             </a:extLst>
           </a:blip>
@@ -5425,7 +5548,7 @@
           <a:noFill/>
           <a:extLst>
             <a:ext uri="{909E8E84-426E-40DD-AFC4-6F175D3DCCD1}">
-              <a14:hiddenFill xmlns:a14="http://schemas.microsoft.com/office/drawing/2010/main">
+              <a14:hiddenFill xmlns:a14="http://schemas.microsoft.com/office/drawing/2010/main" xmlns="">
                 <a:solidFill>
                   <a:srgbClr val="FFFFFF"/>
                 </a:solidFill>
@@ -5437,7 +5560,7 @@
     </p:spTree>
     <p:extLst>
       <p:ext uri="{BB962C8B-B14F-4D97-AF65-F5344CB8AC3E}">
-        <p14:creationId xmlns:p14="http://schemas.microsoft.com/office/powerpoint/2010/main" val="1846401246"/>
+        <p14:creationId xmlns:p14="http://schemas.microsoft.com/office/powerpoint/2010/main" xmlns="" val="1846401246"/>
       </p:ext>
     </p:extLst>
   </p:cSld>
@@ -5550,7 +5673,7 @@
             <a:blip r:embed="rId3" cstate="print">
               <a:extLst>
                 <a:ext uri="{28A0092B-C50C-407E-A947-70E740481C1C}">
-                  <a14:useLocalDpi xmlns:a14="http://schemas.microsoft.com/office/drawing/2010/main" val="0"/>
+                  <a14:useLocalDpi xmlns:a14="http://schemas.microsoft.com/office/drawing/2010/main" xmlns="" val="0"/>
                 </a:ext>
               </a:extLst>
             </a:blip>
@@ -5573,14 +5696,14 @@
             </a:ln>
             <a:extLst>
               <a:ext uri="{909E8E84-426E-40DD-AFC4-6F175D3DCCD1}">
-                <a14:hiddenFill xmlns:a14="http://schemas.microsoft.com/office/drawing/2010/main">
+                <a14:hiddenFill xmlns:a14="http://schemas.microsoft.com/office/drawing/2010/main" xmlns="">
                   <a:solidFill>
                     <a:schemeClr val="accent1"/>
                   </a:solidFill>
                 </a14:hiddenFill>
               </a:ext>
               <a:ext uri="{91240B29-F687-4F45-9708-019B960494DF}">
-                <a14:hiddenLine xmlns:a14="http://schemas.microsoft.com/office/drawing/2010/main" w="9525">
+                <a14:hiddenLine xmlns:a14="http://schemas.microsoft.com/office/drawing/2010/main" xmlns="" w="9525">
                   <a:solidFill>
                     <a:schemeClr val="tx1"/>
                   </a:solidFill>
@@ -5604,7 +5727,7 @@
             <a:blip r:embed="rId3" cstate="print">
               <a:extLst>
                 <a:ext uri="{28A0092B-C50C-407E-A947-70E740481C1C}">
-                  <a14:useLocalDpi xmlns:a14="http://schemas.microsoft.com/office/drawing/2010/main" val="0"/>
+                  <a14:useLocalDpi xmlns:a14="http://schemas.microsoft.com/office/drawing/2010/main" xmlns="" val="0"/>
                 </a:ext>
               </a:extLst>
             </a:blip>
@@ -5627,14 +5750,14 @@
             </a:ln>
             <a:extLst>
               <a:ext uri="{909E8E84-426E-40DD-AFC4-6F175D3DCCD1}">
-                <a14:hiddenFill xmlns:a14="http://schemas.microsoft.com/office/drawing/2010/main">
+                <a14:hiddenFill xmlns:a14="http://schemas.microsoft.com/office/drawing/2010/main" xmlns="">
                   <a:solidFill>
                     <a:schemeClr val="accent1"/>
                   </a:solidFill>
                 </a14:hiddenFill>
               </a:ext>
               <a:ext uri="{91240B29-F687-4F45-9708-019B960494DF}">
-                <a14:hiddenLine xmlns:a14="http://schemas.microsoft.com/office/drawing/2010/main" w="9525">
+                <a14:hiddenLine xmlns:a14="http://schemas.microsoft.com/office/drawing/2010/main" xmlns="" w="9525">
                   <a:solidFill>
                     <a:schemeClr val="tx1"/>
                   </a:solidFill>
@@ -5658,7 +5781,7 @@
             <a:blip r:embed="rId3" cstate="print">
               <a:extLst>
                 <a:ext uri="{28A0092B-C50C-407E-A947-70E740481C1C}">
-                  <a14:useLocalDpi xmlns:a14="http://schemas.microsoft.com/office/drawing/2010/main" val="0"/>
+                  <a14:useLocalDpi xmlns:a14="http://schemas.microsoft.com/office/drawing/2010/main" xmlns="" val="0"/>
                 </a:ext>
               </a:extLst>
             </a:blip>
@@ -5681,14 +5804,14 @@
             </a:ln>
             <a:extLst>
               <a:ext uri="{909E8E84-426E-40DD-AFC4-6F175D3DCCD1}">
-                <a14:hiddenFill xmlns:a14="http://schemas.microsoft.com/office/drawing/2010/main">
+                <a14:hiddenFill xmlns:a14="http://schemas.microsoft.com/office/drawing/2010/main" xmlns="">
                   <a:solidFill>
                     <a:schemeClr val="accent1"/>
                   </a:solidFill>
                 </a14:hiddenFill>
               </a:ext>
               <a:ext uri="{91240B29-F687-4F45-9708-019B960494DF}">
-                <a14:hiddenLine xmlns:a14="http://schemas.microsoft.com/office/drawing/2010/main" w="9525">
+                <a14:hiddenLine xmlns:a14="http://schemas.microsoft.com/office/drawing/2010/main" xmlns="" w="9525">
                   <a:solidFill>
                     <a:schemeClr val="tx1"/>
                   </a:solidFill>
@@ -5712,7 +5835,7 @@
             <a:blip r:embed="rId3" cstate="print">
               <a:extLst>
                 <a:ext uri="{28A0092B-C50C-407E-A947-70E740481C1C}">
-                  <a14:useLocalDpi xmlns:a14="http://schemas.microsoft.com/office/drawing/2010/main" val="0"/>
+                  <a14:useLocalDpi xmlns:a14="http://schemas.microsoft.com/office/drawing/2010/main" xmlns="" val="0"/>
                 </a:ext>
               </a:extLst>
             </a:blip>
@@ -5735,14 +5858,14 @@
             </a:ln>
             <a:extLst>
               <a:ext uri="{909E8E84-426E-40DD-AFC4-6F175D3DCCD1}">
-                <a14:hiddenFill xmlns:a14="http://schemas.microsoft.com/office/drawing/2010/main">
+                <a14:hiddenFill xmlns:a14="http://schemas.microsoft.com/office/drawing/2010/main" xmlns="">
                   <a:solidFill>
                     <a:schemeClr val="accent1"/>
                   </a:solidFill>
                 </a14:hiddenFill>
               </a:ext>
               <a:ext uri="{91240B29-F687-4F45-9708-019B960494DF}">
-                <a14:hiddenLine xmlns:a14="http://schemas.microsoft.com/office/drawing/2010/main" w="9525">
+                <a14:hiddenLine xmlns:a14="http://schemas.microsoft.com/office/drawing/2010/main" xmlns="" w="9525">
                   <a:solidFill>
                     <a:schemeClr val="tx1"/>
                   </a:solidFill>
@@ -5767,7 +5890,7 @@
           <a:blip r:embed="rId4" cstate="print">
             <a:extLst>
               <a:ext uri="{28A0092B-C50C-407E-A947-70E740481C1C}">
-                <a14:useLocalDpi xmlns:a14="http://schemas.microsoft.com/office/drawing/2010/main" val="0"/>
+                <a14:useLocalDpi xmlns:a14="http://schemas.microsoft.com/office/drawing/2010/main" xmlns="" val="0"/>
               </a:ext>
             </a:extLst>
           </a:blip>
@@ -5794,7 +5917,7 @@
           </a:ln>
           <a:extLst>
             <a:ext uri="{909E8E84-426E-40DD-AFC4-6F175D3DCCD1}">
-              <a14:hiddenFill xmlns:a14="http://schemas.microsoft.com/office/drawing/2010/main">
+              <a14:hiddenFill xmlns:a14="http://schemas.microsoft.com/office/drawing/2010/main" xmlns="">
                 <a:solidFill>
                   <a:srgbClr val="FFFFFF"/>
                 </a:solidFill>
@@ -5815,7 +5938,7 @@
           <a:blip r:embed="rId5" cstate="print">
             <a:extLst>
               <a:ext uri="{28A0092B-C50C-407E-A947-70E740481C1C}">
-                <a14:useLocalDpi xmlns:a14="http://schemas.microsoft.com/office/drawing/2010/main" val="0"/>
+                <a14:useLocalDpi xmlns:a14="http://schemas.microsoft.com/office/drawing/2010/main" xmlns="" val="0"/>
               </a:ext>
             </a:extLst>
           </a:blip>
@@ -5835,7 +5958,7 @@
           <a:noFill/>
           <a:extLst>
             <a:ext uri="{909E8E84-426E-40DD-AFC4-6F175D3DCCD1}">
-              <a14:hiddenFill xmlns:a14="http://schemas.microsoft.com/office/drawing/2010/main">
+              <a14:hiddenFill xmlns:a14="http://schemas.microsoft.com/office/drawing/2010/main" xmlns="">
                 <a:solidFill>
                   <a:srgbClr val="FFFFFF"/>
                 </a:solidFill>
@@ -5856,7 +5979,7 @@
           <a:blip r:embed="rId6" cstate="print">
             <a:extLst>
               <a:ext uri="{28A0092B-C50C-407E-A947-70E740481C1C}">
-                <a14:useLocalDpi xmlns:a14="http://schemas.microsoft.com/office/drawing/2010/main" val="0"/>
+                <a14:useLocalDpi xmlns:a14="http://schemas.microsoft.com/office/drawing/2010/main" xmlns="" val="0"/>
               </a:ext>
             </a:extLst>
           </a:blip>
@@ -5876,7 +5999,7 @@
           <a:noFill/>
           <a:extLst>
             <a:ext uri="{909E8E84-426E-40DD-AFC4-6F175D3DCCD1}">
-              <a14:hiddenFill xmlns:a14="http://schemas.microsoft.com/office/drawing/2010/main">
+              <a14:hiddenFill xmlns:a14="http://schemas.microsoft.com/office/drawing/2010/main" xmlns="">
                 <a:solidFill>
                   <a:srgbClr val="FFFFFF"/>
                 </a:solidFill>
@@ -6906,7 +7029,7 @@
           <a:blip r:embed="rId7" cstate="print">
             <a:extLst>
               <a:ext uri="{28A0092B-C50C-407E-A947-70E740481C1C}">
-                <a14:useLocalDpi xmlns:a14="http://schemas.microsoft.com/office/drawing/2010/main" val="0"/>
+                <a14:useLocalDpi xmlns:a14="http://schemas.microsoft.com/office/drawing/2010/main" xmlns="" val="0"/>
               </a:ext>
             </a:extLst>
           </a:blip>
@@ -6931,7 +7054,7 @@
           </a:ln>
           <a:extLst>
             <a:ext uri="{909E8E84-426E-40DD-AFC4-6F175D3DCCD1}">
-              <a14:hiddenFill xmlns:a14="http://schemas.microsoft.com/office/drawing/2010/main">
+              <a14:hiddenFill xmlns:a14="http://schemas.microsoft.com/office/drawing/2010/main" xmlns="">
                 <a:solidFill>
                   <a:srgbClr val="FFFFFF"/>
                 </a:solidFill>
@@ -8295,7 +8418,7 @@
           <a:blip r:embed="rId8" cstate="print">
             <a:extLst>
               <a:ext uri="{28A0092B-C50C-407E-A947-70E740481C1C}">
-                <a14:useLocalDpi xmlns:a14="http://schemas.microsoft.com/office/drawing/2010/main" val="0"/>
+                <a14:useLocalDpi xmlns:a14="http://schemas.microsoft.com/office/drawing/2010/main" xmlns="" val="0"/>
               </a:ext>
             </a:extLst>
           </a:blip>
@@ -8315,7 +8438,7 @@
           <a:noFill/>
           <a:extLst>
             <a:ext uri="{909E8E84-426E-40DD-AFC4-6F175D3DCCD1}">
-              <a14:hiddenFill xmlns:a14="http://schemas.microsoft.com/office/drawing/2010/main">
+              <a14:hiddenFill xmlns:a14="http://schemas.microsoft.com/office/drawing/2010/main" xmlns="">
                 <a:solidFill>
                   <a:srgbClr val="FFFFFF"/>
                 </a:solidFill>
@@ -9198,7 +9321,7 @@
           <a:blip r:embed="rId3" cstate="print">
             <a:extLst>
               <a:ext uri="{28A0092B-C50C-407E-A947-70E740481C1C}">
-                <a14:useLocalDpi xmlns:a14="http://schemas.microsoft.com/office/drawing/2010/main" val="0"/>
+                <a14:useLocalDpi xmlns:a14="http://schemas.microsoft.com/office/drawing/2010/main" xmlns="" val="0"/>
               </a:ext>
             </a:extLst>
           </a:blip>
@@ -9221,14 +9344,14 @@
           </a:ln>
           <a:extLst>
             <a:ext uri="{909E8E84-426E-40DD-AFC4-6F175D3DCCD1}">
-              <a14:hiddenFill xmlns:a14="http://schemas.microsoft.com/office/drawing/2010/main">
+              <a14:hiddenFill xmlns:a14="http://schemas.microsoft.com/office/drawing/2010/main" xmlns="">
                 <a:solidFill>
                   <a:schemeClr val="accent1"/>
                 </a:solidFill>
               </a14:hiddenFill>
             </a:ext>
             <a:ext uri="{91240B29-F687-4F45-9708-019B960494DF}">
-              <a14:hiddenLine xmlns:a14="http://schemas.microsoft.com/office/drawing/2010/main" w="9525">
+              <a14:hiddenLine xmlns:a14="http://schemas.microsoft.com/office/drawing/2010/main" xmlns="" w="9525">
                 <a:solidFill>
                   <a:schemeClr val="tx1"/>
                 </a:solidFill>
@@ -10124,7 +10247,7 @@
     </p:spTree>
     <p:extLst>
       <p:ext uri="{BB962C8B-B14F-4D97-AF65-F5344CB8AC3E}">
-        <p14:creationId xmlns:p14="http://schemas.microsoft.com/office/powerpoint/2010/main" val="4231056502"/>
+        <p14:creationId xmlns:p14="http://schemas.microsoft.com/office/powerpoint/2010/main" xmlns="" val="4231056502"/>
       </p:ext>
     </p:extLst>
   </p:cSld>
@@ -10511,7 +10634,7 @@
           <p:nvPr>
             <p:extLst>
               <p:ext uri="{D42A27DB-BD31-4B8C-83A1-F6EECF244321}">
-                <p14:modId xmlns:p14="http://schemas.microsoft.com/office/powerpoint/2010/main" val="1287980454"/>
+                <p14:modId xmlns:p14="http://schemas.microsoft.com/office/powerpoint/2010/main" xmlns="" val="1287980454"/>
               </p:ext>
             </p:extLst>
           </p:nvPr>
@@ -10522,59 +10645,9 @@
         </p:xfrm>
         <a:graphic>
           <a:graphicData uri="http://schemas.openxmlformats.org/presentationml/2006/ole">
-            <mc:AlternateContent xmlns:mc="http://schemas.openxmlformats.org/markup-compatibility/2006">
-              <mc:Choice xmlns:v="urn:schemas-microsoft-com:vml" Requires="v">
-                <p:oleObj spid="_x0000_s1558" name="数式" r:id="rId3" imgW="152268" imgH="215713" progId="Equation.3">
-                  <p:embed/>
-                </p:oleObj>
-              </mc:Choice>
-              <mc:Fallback>
-                <p:oleObj name="数式" r:id="rId3" imgW="152268" imgH="215713" progId="Equation.3">
-                  <p:embed/>
-                  <p:pic>
-                    <p:nvPicPr>
-                      <p:cNvPr id="0" name="Picture 158"/>
-                      <p:cNvPicPr>
-                        <a:picLocks noChangeAspect="1" noChangeArrowheads="1"/>
-                      </p:cNvPicPr>
-                      <p:nvPr/>
-                    </p:nvPicPr>
-                    <p:blipFill>
-                      <a:blip r:embed="rId4">
-                        <a:extLst>
-                          <a:ext uri="{28A0092B-C50C-407E-A947-70E740481C1C}">
-                            <a14:useLocalDpi xmlns:a14="http://schemas.microsoft.com/office/drawing/2010/main" val="0"/>
-                          </a:ext>
-                        </a:extLst>
-                      </a:blip>
-                      <a:srcRect/>
-                      <a:stretch>
-                        <a:fillRect/>
-                      </a:stretch>
-                    </p:blipFill>
-                    <p:spPr bwMode="auto">
-                      <a:xfrm>
-                        <a:off x="4237355" y="1740101"/>
-                        <a:ext cx="379181" cy="537173"/>
-                      </a:xfrm>
-                      <a:prstGeom prst="rect">
-                        <a:avLst/>
-                      </a:prstGeom>
-                      <a:noFill/>
-                      <a:extLst>
-                        <a:ext uri="{909E8E84-426E-40DD-AFC4-6F175D3DCCD1}">
-                          <a14:hiddenFill xmlns:a14="http://schemas.microsoft.com/office/drawing/2010/main">
-                            <a:solidFill>
-                              <a:srgbClr val="FFFFFF"/>
-                            </a:solidFill>
-                          </a14:hiddenFill>
-                        </a:ext>
-                      </a:extLst>
-                    </p:spPr>
-                  </p:pic>
-                </p:oleObj>
-              </mc:Fallback>
-            </mc:AlternateContent>
+            <p:oleObj spid="_x0000_s1558" name="数式" r:id="rId3" imgW="152268" imgH="215713" progId="Equation.3">
+              <p:embed/>
+            </p:oleObj>
           </a:graphicData>
         </a:graphic>
       </p:graphicFrame>
@@ -10587,7 +10660,7 @@
           <p:nvPr>
             <p:extLst>
               <p:ext uri="{D42A27DB-BD31-4B8C-83A1-F6EECF244321}">
-                <p14:modId xmlns:p14="http://schemas.microsoft.com/office/powerpoint/2010/main" val="3763117844"/>
+                <p14:modId xmlns:p14="http://schemas.microsoft.com/office/powerpoint/2010/main" xmlns="" val="3763117844"/>
               </p:ext>
             </p:extLst>
           </p:nvPr>
@@ -10598,59 +10671,9 @@
         </p:xfrm>
         <a:graphic>
           <a:graphicData uri="http://schemas.openxmlformats.org/presentationml/2006/ole">
-            <mc:AlternateContent xmlns:mc="http://schemas.openxmlformats.org/markup-compatibility/2006">
-              <mc:Choice xmlns:v="urn:schemas-microsoft-com:vml" Requires="v">
-                <p:oleObj spid="_x0000_s1559" name="数式" r:id="rId5" imgW="152268" imgH="215713" progId="Equation.3">
-                  <p:embed/>
-                </p:oleObj>
-              </mc:Choice>
-              <mc:Fallback>
-                <p:oleObj name="数式" r:id="rId5" imgW="152268" imgH="215713" progId="Equation.3">
-                  <p:embed/>
-                  <p:pic>
-                    <p:nvPicPr>
-                      <p:cNvPr id="0" name="Picture 159"/>
-                      <p:cNvPicPr>
-                        <a:picLocks noChangeAspect="1" noChangeArrowheads="1"/>
-                      </p:cNvPicPr>
-                      <p:nvPr/>
-                    </p:nvPicPr>
-                    <p:blipFill>
-                      <a:blip r:embed="rId6">
-                        <a:extLst>
-                          <a:ext uri="{28A0092B-C50C-407E-A947-70E740481C1C}">
-                            <a14:useLocalDpi xmlns:a14="http://schemas.microsoft.com/office/drawing/2010/main" val="0"/>
-                          </a:ext>
-                        </a:extLst>
-                      </a:blip>
-                      <a:srcRect/>
-                      <a:stretch>
-                        <a:fillRect/>
-                      </a:stretch>
-                    </p:blipFill>
-                    <p:spPr bwMode="auto">
-                      <a:xfrm>
-                        <a:off x="4828119" y="3106335"/>
-                        <a:ext cx="379413" cy="536575"/>
-                      </a:xfrm>
-                      <a:prstGeom prst="rect">
-                        <a:avLst/>
-                      </a:prstGeom>
-                      <a:noFill/>
-                      <a:extLst>
-                        <a:ext uri="{909E8E84-426E-40DD-AFC4-6F175D3DCCD1}">
-                          <a14:hiddenFill xmlns:a14="http://schemas.microsoft.com/office/drawing/2010/main">
-                            <a:solidFill>
-                              <a:srgbClr val="FFFFFF"/>
-                            </a:solidFill>
-                          </a14:hiddenFill>
-                        </a:ext>
-                      </a:extLst>
-                    </p:spPr>
-                  </p:pic>
-                </p:oleObj>
-              </mc:Fallback>
-            </mc:AlternateContent>
+            <p:oleObj spid="_x0000_s1559" name="数式" r:id="rId4" imgW="152268" imgH="215713" progId="Equation.3">
+              <p:embed/>
+            </p:oleObj>
           </a:graphicData>
         </a:graphic>
       </p:graphicFrame>
@@ -10663,7 +10686,7 @@
           <p:nvPr>
             <p:extLst>
               <p:ext uri="{D42A27DB-BD31-4B8C-83A1-F6EECF244321}">
-                <p14:modId xmlns:p14="http://schemas.microsoft.com/office/powerpoint/2010/main" val="3262427855"/>
+                <p14:modId xmlns:p14="http://schemas.microsoft.com/office/powerpoint/2010/main" xmlns="" val="3262427855"/>
               </p:ext>
             </p:extLst>
           </p:nvPr>
@@ -10674,59 +10697,9 @@
         </p:xfrm>
         <a:graphic>
           <a:graphicData uri="http://schemas.openxmlformats.org/presentationml/2006/ole">
-            <mc:AlternateContent xmlns:mc="http://schemas.openxmlformats.org/markup-compatibility/2006">
-              <mc:Choice xmlns:v="urn:schemas-microsoft-com:vml" Requires="v">
-                <p:oleObj spid="_x0000_s1560" name="数式" r:id="rId7" imgW="736280" imgH="215806" progId="Equation.3">
-                  <p:embed/>
-                </p:oleObj>
-              </mc:Choice>
-              <mc:Fallback>
-                <p:oleObj name="数式" r:id="rId7" imgW="736280" imgH="215806" progId="Equation.3">
-                  <p:embed/>
-                  <p:pic>
-                    <p:nvPicPr>
-                      <p:cNvPr id="0" name="Picture 160"/>
-                      <p:cNvPicPr>
-                        <a:picLocks noChangeAspect="1" noChangeArrowheads="1"/>
-                      </p:cNvPicPr>
-                      <p:nvPr/>
-                    </p:nvPicPr>
-                    <p:blipFill>
-                      <a:blip r:embed="rId8">
-                        <a:extLst>
-                          <a:ext uri="{28A0092B-C50C-407E-A947-70E740481C1C}">
-                            <a14:useLocalDpi xmlns:a14="http://schemas.microsoft.com/office/drawing/2010/main" val="0"/>
-                          </a:ext>
-                        </a:extLst>
-                      </a:blip>
-                      <a:srcRect/>
-                      <a:stretch>
-                        <a:fillRect/>
-                      </a:stretch>
-                    </p:blipFill>
-                    <p:spPr bwMode="auto">
-                      <a:xfrm>
-                        <a:off x="6696075" y="1650616"/>
-                        <a:ext cx="1835150" cy="536575"/>
-                      </a:xfrm>
-                      <a:prstGeom prst="rect">
-                        <a:avLst/>
-                      </a:prstGeom>
-                      <a:noFill/>
-                      <a:extLst>
-                        <a:ext uri="{909E8E84-426E-40DD-AFC4-6F175D3DCCD1}">
-                          <a14:hiddenFill xmlns:a14="http://schemas.microsoft.com/office/drawing/2010/main">
-                            <a:solidFill>
-                              <a:srgbClr val="FFFFFF"/>
-                            </a:solidFill>
-                          </a14:hiddenFill>
-                        </a:ext>
-                      </a:extLst>
-                    </p:spPr>
-                  </p:pic>
-                </p:oleObj>
-              </mc:Fallback>
-            </mc:AlternateContent>
+            <p:oleObj spid="_x0000_s1560" name="数式" r:id="rId5" imgW="736280" imgH="215806" progId="Equation.3">
+              <p:embed/>
+            </p:oleObj>
           </a:graphicData>
         </a:graphic>
       </p:graphicFrame>
@@ -10782,7 +10755,7 @@
           <p:nvPr>
             <p:extLst>
               <p:ext uri="{D42A27DB-BD31-4B8C-83A1-F6EECF244321}">
-                <p14:modId xmlns:p14="http://schemas.microsoft.com/office/powerpoint/2010/main" val="3238307004"/>
+                <p14:modId xmlns:p14="http://schemas.microsoft.com/office/powerpoint/2010/main" xmlns="" val="3238307004"/>
               </p:ext>
             </p:extLst>
           </p:nvPr>
@@ -10793,59 +10766,9 @@
         </p:xfrm>
         <a:graphic>
           <a:graphicData uri="http://schemas.openxmlformats.org/presentationml/2006/ole">
-            <mc:AlternateContent xmlns:mc="http://schemas.openxmlformats.org/markup-compatibility/2006">
-              <mc:Choice xmlns:v="urn:schemas-microsoft-com:vml" Requires="v">
-                <p:oleObj spid="_x0000_s1561" name="数式" r:id="rId9" imgW="1206500" imgH="330200" progId="Equation.3">
-                  <p:embed/>
-                </p:oleObj>
-              </mc:Choice>
-              <mc:Fallback>
-                <p:oleObj name="数式" r:id="rId9" imgW="1206500" imgH="330200" progId="Equation.3">
-                  <p:embed/>
-                  <p:pic>
-                    <p:nvPicPr>
-                      <p:cNvPr id="0" name="Picture 161"/>
-                      <p:cNvPicPr>
-                        <a:picLocks noChangeAspect="1" noChangeArrowheads="1"/>
-                      </p:cNvPicPr>
-                      <p:nvPr/>
-                    </p:nvPicPr>
-                    <p:blipFill>
-                      <a:blip r:embed="rId10">
-                        <a:extLst>
-                          <a:ext uri="{28A0092B-C50C-407E-A947-70E740481C1C}">
-                            <a14:useLocalDpi xmlns:a14="http://schemas.microsoft.com/office/drawing/2010/main" val="0"/>
-                          </a:ext>
-                        </a:extLst>
-                      </a:blip>
-                      <a:srcRect/>
-                      <a:stretch>
-                        <a:fillRect/>
-                      </a:stretch>
-                    </p:blipFill>
-                    <p:spPr bwMode="auto">
-                      <a:xfrm>
-                        <a:off x="7320915" y="4277022"/>
-                        <a:ext cx="3006725" cy="820738"/>
-                      </a:xfrm>
-                      <a:prstGeom prst="rect">
-                        <a:avLst/>
-                      </a:prstGeom>
-                      <a:noFill/>
-                      <a:extLst>
-                        <a:ext uri="{909E8E84-426E-40DD-AFC4-6F175D3DCCD1}">
-                          <a14:hiddenFill xmlns:a14="http://schemas.microsoft.com/office/drawing/2010/main">
-                            <a:solidFill>
-                              <a:srgbClr val="FFFFFF"/>
-                            </a:solidFill>
-                          </a14:hiddenFill>
-                        </a:ext>
-                      </a:extLst>
-                    </p:spPr>
-                  </p:pic>
-                </p:oleObj>
-              </mc:Fallback>
-            </mc:AlternateContent>
+            <p:oleObj spid="_x0000_s1561" name="数式" r:id="rId6" imgW="1206500" imgH="330200" progId="Equation.3">
+              <p:embed/>
+            </p:oleObj>
           </a:graphicData>
         </a:graphic>
       </p:graphicFrame>
@@ -11564,7 +11487,7 @@
     </p:spTree>
     <p:extLst>
       <p:ext uri="{BB962C8B-B14F-4D97-AF65-F5344CB8AC3E}">
-        <p14:creationId xmlns:p14="http://schemas.microsoft.com/office/powerpoint/2010/main" val="1900568499"/>
+        <p14:creationId xmlns:p14="http://schemas.microsoft.com/office/powerpoint/2010/main" xmlns="" val="1900568499"/>
       </p:ext>
     </p:extLst>
   </p:cSld>
@@ -11656,7 +11579,7 @@
     </p:spTree>
     <p:extLst>
       <p:ext uri="{BB962C8B-B14F-4D97-AF65-F5344CB8AC3E}">
-        <p14:creationId xmlns:p14="http://schemas.microsoft.com/office/powerpoint/2010/main" val="550732552"/>
+        <p14:creationId xmlns:p14="http://schemas.microsoft.com/office/powerpoint/2010/main" xmlns="" val="550732552"/>
       </p:ext>
     </p:extLst>
   </p:cSld>
@@ -11866,7 +11789,7 @@
     </p:spTree>
     <p:extLst>
       <p:ext uri="{BB962C8B-B14F-4D97-AF65-F5344CB8AC3E}">
-        <p14:creationId xmlns:p14="http://schemas.microsoft.com/office/powerpoint/2010/main" val="529287410"/>
+        <p14:creationId xmlns:p14="http://schemas.microsoft.com/office/powerpoint/2010/main" xmlns="" val="529287410"/>
       </p:ext>
     </p:extLst>
   </p:cSld>
@@ -11969,7 +11892,7 @@
     </p:spTree>
     <p:extLst>
       <p:ext uri="{BB962C8B-B14F-4D97-AF65-F5344CB8AC3E}">
-        <p14:creationId xmlns:p14="http://schemas.microsoft.com/office/powerpoint/2010/main" val="3117917766"/>
+        <p14:creationId xmlns:p14="http://schemas.microsoft.com/office/powerpoint/2010/main" xmlns="" val="3117917766"/>
       </p:ext>
     </p:extLst>
   </p:cSld>
@@ -12087,7 +12010,7 @@
     </p:spTree>
     <p:extLst>
       <p:ext uri="{BB962C8B-B14F-4D97-AF65-F5344CB8AC3E}">
-        <p14:creationId xmlns:p14="http://schemas.microsoft.com/office/powerpoint/2010/main" val="1766755709"/>
+        <p14:creationId xmlns:p14="http://schemas.microsoft.com/office/powerpoint/2010/main" xmlns="" val="1766755709"/>
       </p:ext>
     </p:extLst>
   </p:cSld>
@@ -12316,7 +12239,7 @@
   <a:extraClrSchemeLst/>
   <a:extLst>
     <a:ext uri="{05A4C25C-085E-4340-85A3-A5531E510DB2}">
-      <thm15:themeFamily xmlns:thm15="http://schemas.microsoft.com/office/thememl/2012/main" xmlns="" name="Office Theme" id="{62F939B6-93AF-4DB8-9C6B-D6C7DFDC589F}" vid="{4A3C46E8-61CC-4603-A589-7422A47A8E4A}"/>
+      <thm15:themeFamily xmlns="" xmlns:thm15="http://schemas.microsoft.com/office/thememl/2012/main" name="Office Theme" id="{62F939B6-93AF-4DB8-9C6B-D6C7DFDC589F}" vid="{4A3C46E8-61CC-4603-A589-7422A47A8E4A}"/>
     </a:ext>
   </a:extLst>
 </a:theme>
@@ -12577,7 +12500,7 @@
   <a:extraClrSchemeLst/>
   <a:extLst>
     <a:ext uri="{05A4C25C-085E-4340-85A3-A5531E510DB2}">
-      <thm15:themeFamily xmlns:thm15="http://schemas.microsoft.com/office/thememl/2012/main" xmlns="" name="Office Theme" id="{62F939B6-93AF-4DB8-9C6B-D6C7DFDC589F}" vid="{4A3C46E8-61CC-4603-A589-7422A47A8E4A}"/>
+      <thm15:themeFamily xmlns="" xmlns:thm15="http://schemas.microsoft.com/office/thememl/2012/main" name="Office Theme" id="{62F939B6-93AF-4DB8-9C6B-D6C7DFDC589F}" vid="{4A3C46E8-61CC-4603-A589-7422A47A8E4A}"/>
     </a:ext>
   </a:extLst>
 </a:theme>

</xml_diff>